<commit_message>
Week 5 ppt pdf with map
</commit_message>
<xml_diff>
--- a/Coursera Capstone Week 5 ppt.pptx
+++ b/Coursera Capstone Week 5 ppt.pptx
@@ -10,8 +10,9 @@
     <p:sldId id="258" r:id="rId4"/>
     <p:sldId id="259" r:id="rId5"/>
     <p:sldId id="260" r:id="rId6"/>
-    <p:sldId id="261" r:id="rId7"/>
-    <p:sldId id="262" r:id="rId8"/>
+    <p:sldId id="263" r:id="rId7"/>
+    <p:sldId id="261" r:id="rId8"/>
+    <p:sldId id="262" r:id="rId9"/>
   </p:sldIdLst>
   <p:sldSz cx="12192000" cy="6858000"/>
   <p:notesSz cx="6858000" cy="9144000"/>
@@ -453,7 +454,7 @@
           <a:p>
             <a:fld id="{950117FD-CDAC-44F7-A057-4F829708B81A}" type="datetimeFigureOut">
               <a:rPr lang="en-US" smtClean="0"/>
-              <a:t>7/23/2020</a:t>
+              <a:t>7/24/2020</a:t>
             </a:fld>
             <a:endParaRPr lang="en-US"/>
           </a:p>
@@ -1541,7 +1542,7 @@
           <a:p>
             <a:fld id="{950117FD-CDAC-44F7-A057-4F829708B81A}" type="datetimeFigureOut">
               <a:rPr lang="en-US" smtClean="0"/>
-              <a:t>7/23/2020</a:t>
+              <a:t>7/24/2020</a:t>
             </a:fld>
             <a:endParaRPr lang="en-US"/>
           </a:p>
@@ -2521,7 +2522,7 @@
           <a:p>
             <a:fld id="{950117FD-CDAC-44F7-A057-4F829708B81A}" type="datetimeFigureOut">
               <a:rPr lang="en-US" smtClean="0"/>
-              <a:t>7/23/2020</a:t>
+              <a:t>7/24/2020</a:t>
             </a:fld>
             <a:endParaRPr lang="en-US"/>
           </a:p>
@@ -3655,7 +3656,7 @@
           <a:p>
             <a:fld id="{950117FD-CDAC-44F7-A057-4F829708B81A}" type="datetimeFigureOut">
               <a:rPr lang="en-US" smtClean="0"/>
-              <a:t>7/23/2020</a:t>
+              <a:t>7/24/2020</a:t>
             </a:fld>
             <a:endParaRPr lang="en-US"/>
           </a:p>
@@ -4688,7 +4689,7 @@
           <a:p>
             <a:fld id="{950117FD-CDAC-44F7-A057-4F829708B81A}" type="datetimeFigureOut">
               <a:rPr lang="en-US" smtClean="0"/>
-              <a:t>7/23/2020</a:t>
+              <a:t>7/24/2020</a:t>
             </a:fld>
             <a:endParaRPr lang="en-US"/>
           </a:p>
@@ -5348,7 +5349,7 @@
           <a:p>
             <a:fld id="{950117FD-CDAC-44F7-A057-4F829708B81A}" type="datetimeFigureOut">
               <a:rPr lang="en-US" smtClean="0"/>
-              <a:t>7/23/2020</a:t>
+              <a:t>7/24/2020</a:t>
             </a:fld>
             <a:endParaRPr lang="en-US"/>
           </a:p>
@@ -6209,7 +6210,7 @@
           <a:p>
             <a:fld id="{950117FD-CDAC-44F7-A057-4F829708B81A}" type="datetimeFigureOut">
               <a:rPr lang="en-US" smtClean="0"/>
-              <a:t>7/23/2020</a:t>
+              <a:t>7/24/2020</a:t>
             </a:fld>
             <a:endParaRPr lang="en-US"/>
           </a:p>
@@ -6399,7 +6400,7 @@
           <a:p>
             <a:fld id="{950117FD-CDAC-44F7-A057-4F829708B81A}" type="datetimeFigureOut">
               <a:rPr lang="en-US" smtClean="0"/>
-              <a:t>7/23/2020</a:t>
+              <a:t>7/24/2020</a:t>
             </a:fld>
             <a:endParaRPr lang="en-US"/>
           </a:p>
@@ -7371,7 +7372,7 @@
           <a:p>
             <a:fld id="{950117FD-CDAC-44F7-A057-4F829708B81A}" type="datetimeFigureOut">
               <a:rPr lang="en-US" smtClean="0"/>
-              <a:t>7/23/2020</a:t>
+              <a:t>7/24/2020</a:t>
             </a:fld>
             <a:endParaRPr lang="en-US"/>
           </a:p>
@@ -7582,7 +7583,7 @@
           <a:p>
             <a:fld id="{950117FD-CDAC-44F7-A057-4F829708B81A}" type="datetimeFigureOut">
               <a:rPr lang="en-US" smtClean="0"/>
-              <a:t>7/23/2020</a:t>
+              <a:t>7/24/2020</a:t>
             </a:fld>
             <a:endParaRPr lang="en-US"/>
           </a:p>
@@ -8616,7 +8617,7 @@
           <a:p>
             <a:fld id="{950117FD-CDAC-44F7-A057-4F829708B81A}" type="datetimeFigureOut">
               <a:rPr lang="en-US" smtClean="0"/>
-              <a:t>7/23/2020</a:t>
+              <a:t>7/24/2020</a:t>
             </a:fld>
             <a:endParaRPr lang="en-US"/>
           </a:p>
@@ -8888,7 +8889,7 @@
           <a:p>
             <a:fld id="{950117FD-CDAC-44F7-A057-4F829708B81A}" type="datetimeFigureOut">
               <a:rPr lang="en-US" smtClean="0"/>
-              <a:t>7/23/2020</a:t>
+              <a:t>7/24/2020</a:t>
             </a:fld>
             <a:endParaRPr lang="en-US"/>
           </a:p>
@@ -9298,7 +9299,7 @@
           <a:p>
             <a:fld id="{950117FD-CDAC-44F7-A057-4F829708B81A}" type="datetimeFigureOut">
               <a:rPr lang="en-US" smtClean="0"/>
-              <a:t>7/23/2020</a:t>
+              <a:t>7/24/2020</a:t>
             </a:fld>
             <a:endParaRPr lang="en-US"/>
           </a:p>
@@ -9425,7 +9426,7 @@
           <a:p>
             <a:fld id="{950117FD-CDAC-44F7-A057-4F829708B81A}" type="datetimeFigureOut">
               <a:rPr lang="en-US" smtClean="0"/>
-              <a:t>7/23/2020</a:t>
+              <a:t>7/24/2020</a:t>
             </a:fld>
             <a:endParaRPr lang="en-US"/>
           </a:p>
@@ -9520,7 +9521,7 @@
           <a:p>
             <a:fld id="{950117FD-CDAC-44F7-A057-4F829708B81A}" type="datetimeFigureOut">
               <a:rPr lang="en-US" smtClean="0"/>
-              <a:t>7/23/2020</a:t>
+              <a:t>7/24/2020</a:t>
             </a:fld>
             <a:endParaRPr lang="en-US"/>
           </a:p>
@@ -10601,7 +10602,7 @@
           <a:p>
             <a:fld id="{950117FD-CDAC-44F7-A057-4F829708B81A}" type="datetimeFigureOut">
               <a:rPr lang="en-US" smtClean="0"/>
-              <a:t>7/23/2020</a:t>
+              <a:t>7/24/2020</a:t>
             </a:fld>
             <a:endParaRPr lang="en-US"/>
           </a:p>
@@ -11709,7 +11710,7 @@
           <a:p>
             <a:fld id="{950117FD-CDAC-44F7-A057-4F829708B81A}" type="datetimeFigureOut">
               <a:rPr lang="en-US" smtClean="0"/>
-              <a:t>7/23/2020</a:t>
+              <a:t>7/24/2020</a:t>
             </a:fld>
             <a:endParaRPr lang="en-US"/>
           </a:p>
@@ -12706,7 +12707,7 @@
           <a:p>
             <a:fld id="{950117FD-CDAC-44F7-A057-4F829708B81A}" type="datetimeFigureOut">
               <a:rPr lang="en-US" smtClean="0"/>
-              <a:t>7/23/2020</a:t>
+              <a:t>7/24/2020</a:t>
             </a:fld>
             <a:endParaRPr lang="en-US"/>
           </a:p>
@@ -13881,6 +13882,71 @@
           <a:chExt cx="0" cy="0"/>
         </a:xfrm>
       </p:grpSpPr>
+      <p:pic>
+        <p:nvPicPr>
+          <p:cNvPr id="5" name="Content Placeholder 4">
+            <a:extLst>
+              <a:ext uri="{FF2B5EF4-FFF2-40B4-BE49-F238E27FC236}">
+                <a16:creationId xmlns:a16="http://schemas.microsoft.com/office/drawing/2014/main" id="{24FC76E2-8303-488D-8F6B-2CABBEE33F36}"/>
+              </a:ext>
+            </a:extLst>
+          </p:cNvPr>
+          <p:cNvPicPr>
+            <a:picLocks noGrp="1" noChangeAspect="1"/>
+          </p:cNvPicPr>
+          <p:nvPr>
+            <p:ph idx="1"/>
+          </p:nvPr>
+        </p:nvPicPr>
+        <p:blipFill>
+          <a:blip r:embed="rId2">
+            <a:extLst>
+              <a:ext uri="{28A0092B-C50C-407E-A947-70E740481C1C}">
+                <a14:useLocalDpi xmlns:a14="http://schemas.microsoft.com/office/drawing/2010/main" val="0"/>
+              </a:ext>
+            </a:extLst>
+          </a:blip>
+          <a:stretch>
+            <a:fillRect/>
+          </a:stretch>
+        </p:blipFill>
+        <p:spPr>
+          <a:xfrm>
+            <a:off x="2727860" y="2603500"/>
+            <a:ext cx="5680592" cy="3416300"/>
+          </a:xfrm>
+        </p:spPr>
+      </p:pic>
+    </p:spTree>
+    <p:extLst>
+      <p:ext uri="{BB962C8B-B14F-4D97-AF65-F5344CB8AC3E}">
+        <p14:creationId xmlns:p14="http://schemas.microsoft.com/office/powerpoint/2010/main" val="1659785319"/>
+      </p:ext>
+    </p:extLst>
+  </p:cSld>
+  <p:clrMapOvr>
+    <a:masterClrMapping/>
+  </p:clrMapOvr>
+</p:sld>
+</file>
+
+<file path=ppt/slides/slide7.xml><?xml version="1.0" encoding="utf-8"?>
+<p:sld xmlns:a="http://schemas.openxmlformats.org/drawingml/2006/main" xmlns:r="http://schemas.openxmlformats.org/officeDocument/2006/relationships" xmlns:p="http://schemas.openxmlformats.org/presentationml/2006/main">
+  <p:cSld>
+    <p:spTree>
+      <p:nvGrpSpPr>
+        <p:cNvPr id="1" name=""/>
+        <p:cNvGrpSpPr/>
+        <p:nvPr/>
+      </p:nvGrpSpPr>
+      <p:grpSpPr>
+        <a:xfrm>
+          <a:off x="0" y="0"/>
+          <a:ext cx="0" cy="0"/>
+          <a:chOff x="0" y="0"/>
+          <a:chExt cx="0" cy="0"/>
+        </a:xfrm>
+      </p:grpSpPr>
       <p:sp>
         <p:nvSpPr>
           <p:cNvPr id="2" name="Title 1">
@@ -13991,7 +14057,7 @@
 </p:sld>
 </file>
 
-<file path=ppt/slides/slide7.xml><?xml version="1.0" encoding="utf-8"?>
+<file path=ppt/slides/slide8.xml><?xml version="1.0" encoding="utf-8"?>
 <p:sld xmlns:a="http://schemas.openxmlformats.org/drawingml/2006/main" xmlns:r="http://schemas.openxmlformats.org/officeDocument/2006/relationships" xmlns:p="http://schemas.openxmlformats.org/presentationml/2006/main">
   <p:cSld>
     <p:spTree>

</xml_diff>